<commit_message>
Week 6 : Project Assignment #2
</commit_message>
<xml_diff>
--- a/TriviaNight.pptx
+++ b/TriviaNight.pptx
@@ -3394,7 +3394,7 @@
             <a:pPr algn="l"/>
             <a:r>
               <a:rPr lang="en-US" sz="4400"/>
-              <a:t>Question 9 of 10 in week 1</a:t>
+              <a:t>Question 9 of 10 in round 1</a:t>
             </a:r>
             <a:endParaRPr lang="en-US" sz="1100"/>
           </a:p>
@@ -3422,7 +3422,7 @@
             <a:pPr algn="l"/>
             <a:r>
               <a:rPr lang="en-US" sz="3600"/>
-              <a:t>Answer 9 of 10 in week 1</a:t>
+              <a:t>Answer 9 of 10 in round 1</a:t>
             </a:r>
             <a:endParaRPr lang="en-US" sz="1100"/>
           </a:p>
@@ -3679,7 +3679,7 @@
             <a:pPr algn="l"/>
             <a:r>
               <a:rPr lang="en-US" sz="4400"/>
-              <a:t>Question 1 of 10 in week 9</a:t>
+              <a:t>Question 1 of 10 in round 9</a:t>
             </a:r>
             <a:endParaRPr lang="en-US" sz="1100"/>
           </a:p>
@@ -3707,7 +3707,7 @@
             <a:pPr algn="l"/>
             <a:r>
               <a:rPr lang="en-US" sz="3600"/>
-              <a:t>Answer 1 of 10 in week 9</a:t>
+              <a:t>Answer 1 of 10 in round 9</a:t>
             </a:r>
             <a:endParaRPr lang="en-US" sz="1100"/>
           </a:p>
@@ -3788,7 +3788,7 @@
             <a:pPr algn="l"/>
             <a:r>
               <a:rPr lang="en-US" sz="4400"/>
-              <a:t>Question 2 of 10 in week 9</a:t>
+              <a:t>Question 2 of 10 in round 9</a:t>
             </a:r>
             <a:endParaRPr lang="en-US" sz="1100"/>
           </a:p>
@@ -3816,7 +3816,7 @@
             <a:pPr algn="l"/>
             <a:r>
               <a:rPr lang="en-US" sz="3600"/>
-              <a:t>Answer 2 of 10 in week 9</a:t>
+              <a:t>Answer 2 of 10 in round 9</a:t>
             </a:r>
             <a:endParaRPr lang="en-US" sz="1100"/>
           </a:p>
@@ -3897,7 +3897,7 @@
             <a:pPr algn="l"/>
             <a:r>
               <a:rPr lang="en-US" sz="4400"/>
-              <a:t>Question 3 of 10 in week 9</a:t>
+              <a:t>Question 3 of 10 in round 9</a:t>
             </a:r>
             <a:endParaRPr lang="en-US" sz="1100"/>
           </a:p>
@@ -3925,7 +3925,7 @@
             <a:pPr algn="l"/>
             <a:r>
               <a:rPr lang="en-US" sz="3600"/>
-              <a:t>Answer 3 of 10 in week 9</a:t>
+              <a:t>Answer 3 of 10 in round 9</a:t>
             </a:r>
             <a:endParaRPr lang="en-US" sz="1100"/>
           </a:p>
@@ -4006,7 +4006,7 @@
             <a:pPr algn="l"/>
             <a:r>
               <a:rPr lang="en-US" sz="4400"/>
-              <a:t>Question 4 of 10 in week 9</a:t>
+              <a:t>Question 4 of 10 in round 9</a:t>
             </a:r>
             <a:endParaRPr lang="en-US" sz="1100"/>
           </a:p>
@@ -4034,7 +4034,7 @@
             <a:pPr algn="l"/>
             <a:r>
               <a:rPr lang="en-US" sz="3600"/>
-              <a:t>Answer 4 of 10 in week 9</a:t>
+              <a:t>Answer 4 of 10 in round 9</a:t>
             </a:r>
             <a:endParaRPr lang="en-US" sz="1100"/>
           </a:p>
@@ -4115,7 +4115,7 @@
             <a:pPr algn="l"/>
             <a:r>
               <a:rPr lang="en-US" sz="4400"/>
-              <a:t>Question 5 of 10 in week 9</a:t>
+              <a:t>Question 5 of 10 in round 9</a:t>
             </a:r>
             <a:endParaRPr lang="en-US" sz="1100"/>
           </a:p>
@@ -4143,7 +4143,7 @@
             <a:pPr algn="l"/>
             <a:r>
               <a:rPr lang="en-US" sz="3600"/>
-              <a:t>Answer 5 of 10 in week 9</a:t>
+              <a:t>Answer 5 of 10 in round 9</a:t>
             </a:r>
             <a:endParaRPr lang="en-US" sz="1100"/>
           </a:p>
@@ -4224,7 +4224,7 @@
             <a:pPr algn="l"/>
             <a:r>
               <a:rPr lang="en-US" sz="4400"/>
-              <a:t>Question 6 of 10 in week 9</a:t>
+              <a:t>Question 6 of 10 in round 9</a:t>
             </a:r>
             <a:endParaRPr lang="en-US" sz="1100"/>
           </a:p>
@@ -4252,7 +4252,7 @@
             <a:pPr algn="l"/>
             <a:r>
               <a:rPr lang="en-US" sz="3600"/>
-              <a:t>Answer 6 of 10 in week 9</a:t>
+              <a:t>Answer 6 of 10 in round 9</a:t>
             </a:r>
             <a:endParaRPr lang="en-US" sz="1100"/>
           </a:p>
@@ -4333,7 +4333,7 @@
             <a:pPr algn="l"/>
             <a:r>
               <a:rPr lang="en-US" sz="4400"/>
-              <a:t>Question 7 of 10 in week 9</a:t>
+              <a:t>Question 7 of 10 in round 9</a:t>
             </a:r>
             <a:endParaRPr lang="en-US" sz="1100"/>
           </a:p>
@@ -4361,7 +4361,7 @@
             <a:pPr algn="l"/>
             <a:r>
               <a:rPr lang="en-US" sz="3600"/>
-              <a:t>Answer 7 of 10 in week 9</a:t>
+              <a:t>Answer 7 of 10 in round 9</a:t>
             </a:r>
             <a:endParaRPr lang="en-US" sz="1100"/>
           </a:p>
@@ -4442,7 +4442,7 @@
             <a:pPr algn="l"/>
             <a:r>
               <a:rPr lang="en-US" sz="4400"/>
-              <a:t>Question 8 of 10 in week 9</a:t>
+              <a:t>Question 8 of 10 in round 9</a:t>
             </a:r>
             <a:endParaRPr lang="en-US" sz="1100"/>
           </a:p>
@@ -4470,7 +4470,7 @@
             <a:pPr algn="l"/>
             <a:r>
               <a:rPr lang="en-US" sz="3600"/>
-              <a:t>Answer 8 of 10 in week 9</a:t>
+              <a:t>Answer 8 of 10 in round 9</a:t>
             </a:r>
             <a:endParaRPr lang="en-US" sz="1100"/>
           </a:p>
@@ -4551,7 +4551,7 @@
             <a:pPr algn="l"/>
             <a:r>
               <a:rPr lang="en-US" sz="4400"/>
-              <a:t>Question 9 of 10 in week 9</a:t>
+              <a:t>Question 9 of 10 in round 9</a:t>
             </a:r>
             <a:endParaRPr lang="en-US" sz="1100"/>
           </a:p>
@@ -4579,7 +4579,7 @@
             <a:pPr algn="l"/>
             <a:r>
               <a:rPr lang="en-US" sz="3600"/>
-              <a:t>Answer 9 of 10 in week 9</a:t>
+              <a:t>Answer 9 of 10 in round 9</a:t>
             </a:r>
             <a:endParaRPr lang="en-US" sz="1100"/>
           </a:p>
@@ -4660,7 +4660,7 @@
             <a:pPr algn="l"/>
             <a:r>
               <a:rPr lang="en-US" sz="4400"/>
-              <a:t>Question 10 of 10 in week 1</a:t>
+              <a:t>Question 10 of 10 in round 1</a:t>
             </a:r>
             <a:endParaRPr lang="en-US" sz="1100"/>
           </a:p>
@@ -4688,7 +4688,7 @@
             <a:pPr algn="l"/>
             <a:r>
               <a:rPr lang="en-US" sz="3600"/>
-              <a:t>Answer 10 of 10 in week 1</a:t>
+              <a:t>Answer 10 of 10 in round 1</a:t>
             </a:r>
             <a:endParaRPr lang="en-US" sz="1100"/>
           </a:p>
@@ -4769,7 +4769,7 @@
             <a:pPr algn="l"/>
             <a:r>
               <a:rPr lang="en-US" sz="4400"/>
-              <a:t>Question 10 of 10 in week 9</a:t>
+              <a:t>Question 10 of 10 in round 9</a:t>
             </a:r>
             <a:endParaRPr lang="en-US" sz="1100"/>
           </a:p>
@@ -4797,7 +4797,7 @@
             <a:pPr algn="l"/>
             <a:r>
               <a:rPr lang="en-US" sz="3600"/>
-              <a:t>Answer 10 of 10 in week 9</a:t>
+              <a:t>Answer 10 of 10 in round 9</a:t>
             </a:r>
             <a:endParaRPr lang="en-US" sz="1100"/>
           </a:p>
@@ -5054,7 +5054,7 @@
             <a:pPr algn="l"/>
             <a:r>
               <a:rPr lang="en-US" sz="4400"/>
-              <a:t>Question 1 of 10 in week 10</a:t>
+              <a:t>Question 1 of 10 in round 10</a:t>
             </a:r>
             <a:endParaRPr lang="en-US" sz="1100"/>
           </a:p>
@@ -5082,7 +5082,7 @@
             <a:pPr algn="l"/>
             <a:r>
               <a:rPr lang="en-US" sz="3600"/>
-              <a:t>Answer 1 of 10 in week 10</a:t>
+              <a:t>Answer 1 of 10 in round 10</a:t>
             </a:r>
             <a:endParaRPr lang="en-US" sz="1100"/>
           </a:p>
@@ -5163,7 +5163,7 @@
             <a:pPr algn="l"/>
             <a:r>
               <a:rPr lang="en-US" sz="4400"/>
-              <a:t>Question 2 of 10 in week 10</a:t>
+              <a:t>Question 2 of 10 in round 10</a:t>
             </a:r>
             <a:endParaRPr lang="en-US" sz="1100"/>
           </a:p>
@@ -5191,7 +5191,7 @@
             <a:pPr algn="l"/>
             <a:r>
               <a:rPr lang="en-US" sz="3600"/>
-              <a:t>Answer 2 of 10 in week 10</a:t>
+              <a:t>Answer 2 of 10 in round 10</a:t>
             </a:r>
             <a:endParaRPr lang="en-US" sz="1100"/>
           </a:p>
@@ -5272,7 +5272,7 @@
             <a:pPr algn="l"/>
             <a:r>
               <a:rPr lang="en-US" sz="4400"/>
-              <a:t>Question 3 of 10 in week 10</a:t>
+              <a:t>Question 3 of 10 in round 10</a:t>
             </a:r>
             <a:endParaRPr lang="en-US" sz="1100"/>
           </a:p>
@@ -5300,7 +5300,7 @@
             <a:pPr algn="l"/>
             <a:r>
               <a:rPr lang="en-US" sz="3600"/>
-              <a:t>Answer 3 of 10 in week 10</a:t>
+              <a:t>Answer 3 of 10 in round 10</a:t>
             </a:r>
             <a:endParaRPr lang="en-US" sz="1100"/>
           </a:p>
@@ -5381,7 +5381,7 @@
             <a:pPr algn="l"/>
             <a:r>
               <a:rPr lang="en-US" sz="4400"/>
-              <a:t>Question 4 of 10 in week 10</a:t>
+              <a:t>Question 4 of 10 in round 10</a:t>
             </a:r>
             <a:endParaRPr lang="en-US" sz="1100"/>
           </a:p>
@@ -5409,7 +5409,7 @@
             <a:pPr algn="l"/>
             <a:r>
               <a:rPr lang="en-US" sz="3600"/>
-              <a:t>Answer 4 of 10 in week 10</a:t>
+              <a:t>Answer 4 of 10 in round 10</a:t>
             </a:r>
             <a:endParaRPr lang="en-US" sz="1100"/>
           </a:p>
@@ -5490,7 +5490,7 @@
             <a:pPr algn="l"/>
             <a:r>
               <a:rPr lang="en-US" sz="4400"/>
-              <a:t>Question 5 of 10 in week 10</a:t>
+              <a:t>Question 5 of 10 in round 10</a:t>
             </a:r>
             <a:endParaRPr lang="en-US" sz="1100"/>
           </a:p>
@@ -5518,7 +5518,7 @@
             <a:pPr algn="l"/>
             <a:r>
               <a:rPr lang="en-US" sz="3600"/>
-              <a:t>Answer 5 of 10 in week 10</a:t>
+              <a:t>Answer 5 of 10 in round 10</a:t>
             </a:r>
             <a:endParaRPr lang="en-US" sz="1100"/>
           </a:p>
@@ -5599,7 +5599,7 @@
             <a:pPr algn="l"/>
             <a:r>
               <a:rPr lang="en-US" sz="4400"/>
-              <a:t>Question 6 of 10 in week 10</a:t>
+              <a:t>Question 6 of 10 in round 10</a:t>
             </a:r>
             <a:endParaRPr lang="en-US" sz="1100"/>
           </a:p>
@@ -5627,7 +5627,7 @@
             <a:pPr algn="l"/>
             <a:r>
               <a:rPr lang="en-US" sz="3600"/>
-              <a:t>Answer 6 of 10 in week 10</a:t>
+              <a:t>Answer 6 of 10 in round 10</a:t>
             </a:r>
             <a:endParaRPr lang="en-US" sz="1100"/>
           </a:p>
@@ -5708,7 +5708,7 @@
             <a:pPr algn="l"/>
             <a:r>
               <a:rPr lang="en-US" sz="4400"/>
-              <a:t>Question 7 of 10 in week 10</a:t>
+              <a:t>Question 7 of 10 in round 10</a:t>
             </a:r>
             <a:endParaRPr lang="en-US" sz="1100"/>
           </a:p>
@@ -5736,7 +5736,7 @@
             <a:pPr algn="l"/>
             <a:r>
               <a:rPr lang="en-US" sz="3600"/>
-              <a:t>Answer 7 of 10 in week 10</a:t>
+              <a:t>Answer 7 of 10 in round 10</a:t>
             </a:r>
             <a:endParaRPr lang="en-US" sz="1100"/>
           </a:p>
@@ -5817,7 +5817,7 @@
             <a:pPr algn="l"/>
             <a:r>
               <a:rPr lang="en-US" sz="4400"/>
-              <a:t>Question 1 of 10 in week 1</a:t>
+              <a:t>Question 1 of 10 in round 1</a:t>
             </a:r>
             <a:endParaRPr lang="en-US" sz="1100"/>
           </a:p>
@@ -5845,7 +5845,7 @@
             <a:pPr algn="l"/>
             <a:r>
               <a:rPr lang="en-US" sz="3600"/>
-              <a:t>Answer 1 of 10 in week 1</a:t>
+              <a:t>Answer 1 of 10 in round 1</a:t>
             </a:r>
             <a:endParaRPr lang="en-US" sz="1100"/>
           </a:p>
@@ -5926,7 +5926,7 @@
             <a:pPr algn="l"/>
             <a:r>
               <a:rPr lang="en-US" sz="4400"/>
-              <a:t>Question 8 of 10 in week 10</a:t>
+              <a:t>Question 8 of 10 in round 10</a:t>
             </a:r>
             <a:endParaRPr lang="en-US" sz="1100"/>
           </a:p>
@@ -5954,7 +5954,7 @@
             <a:pPr algn="l"/>
             <a:r>
               <a:rPr lang="en-US" sz="3600"/>
-              <a:t>Answer 8 of 10 in week 10</a:t>
+              <a:t>Answer 8 of 10 in round 10</a:t>
             </a:r>
             <a:endParaRPr lang="en-US" sz="1100"/>
           </a:p>
@@ -6035,7 +6035,7 @@
             <a:pPr algn="l"/>
             <a:r>
               <a:rPr lang="en-US" sz="4400"/>
-              <a:t>Question 9 of 10 in week 10</a:t>
+              <a:t>Question 9 of 10 in round 10</a:t>
             </a:r>
             <a:endParaRPr lang="en-US" sz="1100"/>
           </a:p>
@@ -6063,7 +6063,7 @@
             <a:pPr algn="l"/>
             <a:r>
               <a:rPr lang="en-US" sz="3600"/>
-              <a:t>Answer 9 of 10 in week 10</a:t>
+              <a:t>Answer 9 of 10 in round 10</a:t>
             </a:r>
             <a:endParaRPr lang="en-US" sz="1100"/>
           </a:p>
@@ -6144,7 +6144,7 @@
             <a:pPr algn="l"/>
             <a:r>
               <a:rPr lang="en-US" sz="4400"/>
-              <a:t>Question 10 of 10 in week 10</a:t>
+              <a:t>Question 10 of 10 in round 10</a:t>
             </a:r>
             <a:endParaRPr lang="en-US" sz="1100"/>
           </a:p>
@@ -6172,7 +6172,7 @@
             <a:pPr algn="l"/>
             <a:r>
               <a:rPr lang="en-US" sz="3600"/>
-              <a:t>Answer 10 of 10 in week 10</a:t>
+              <a:t>Answer 10 of 10 in round 10</a:t>
             </a:r>
             <a:endParaRPr lang="en-US" sz="1100"/>
           </a:p>
@@ -6429,7 +6429,7 @@
             <a:pPr algn="l"/>
             <a:r>
               <a:rPr lang="en-US" sz="4400"/>
-              <a:t>Question 1 of 10 in week 2</a:t>
+              <a:t>Question 1 of 10 in round 2</a:t>
             </a:r>
             <a:endParaRPr lang="en-US" sz="1100"/>
           </a:p>
@@ -6457,7 +6457,7 @@
             <a:pPr algn="l"/>
             <a:r>
               <a:rPr lang="en-US" sz="3600"/>
-              <a:t>Answer 1 of 10 in week 2</a:t>
+              <a:t>Answer 1 of 10 in round 2</a:t>
             </a:r>
             <a:endParaRPr lang="en-US" sz="1100"/>
           </a:p>
@@ -6538,7 +6538,7 @@
             <a:pPr algn="l"/>
             <a:r>
               <a:rPr lang="en-US" sz="4400"/>
-              <a:t>Question 2 of 10 in week 2</a:t>
+              <a:t>Question 2 of 10 in round 2</a:t>
             </a:r>
             <a:endParaRPr lang="en-US" sz="1100"/>
           </a:p>
@@ -6566,7 +6566,7 @@
             <a:pPr algn="l"/>
             <a:r>
               <a:rPr lang="en-US" sz="3600"/>
-              <a:t>Answer 2 of 10 in week 2</a:t>
+              <a:t>Answer 2 of 10 in round 2</a:t>
             </a:r>
             <a:endParaRPr lang="en-US" sz="1100"/>
           </a:p>
@@ -6647,7 +6647,7 @@
             <a:pPr algn="l"/>
             <a:r>
               <a:rPr lang="en-US" sz="4400"/>
-              <a:t>Question 3 of 10 in week 2</a:t>
+              <a:t>Question 3 of 10 in round 2</a:t>
             </a:r>
             <a:endParaRPr lang="en-US" sz="1100"/>
           </a:p>
@@ -6675,7 +6675,7 @@
             <a:pPr algn="l"/>
             <a:r>
               <a:rPr lang="en-US" sz="3600"/>
-              <a:t>Answer 3 of 10 in week 2</a:t>
+              <a:t>Answer 3 of 10 in round 2</a:t>
             </a:r>
             <a:endParaRPr lang="en-US" sz="1100"/>
           </a:p>
@@ -6756,7 +6756,7 @@
             <a:pPr algn="l"/>
             <a:r>
               <a:rPr lang="en-US" sz="4400"/>
-              <a:t>Question 4 of 10 in week 2</a:t>
+              <a:t>Question 4 of 10 in round 2</a:t>
             </a:r>
             <a:endParaRPr lang="en-US" sz="1100"/>
           </a:p>
@@ -6784,7 +6784,7 @@
             <a:pPr algn="l"/>
             <a:r>
               <a:rPr lang="en-US" sz="3600"/>
-              <a:t>Answer 4 of 10 in week 2</a:t>
+              <a:t>Answer 4 of 10 in round 2</a:t>
             </a:r>
             <a:endParaRPr lang="en-US" sz="1100"/>
           </a:p>
@@ -6865,7 +6865,7 @@
             <a:pPr algn="l"/>
             <a:r>
               <a:rPr lang="en-US" sz="4400"/>
-              <a:t>Question 5 of 10 in week 2</a:t>
+              <a:t>Question 5 of 10 in round 2</a:t>
             </a:r>
             <a:endParaRPr lang="en-US" sz="1100"/>
           </a:p>
@@ -6893,7 +6893,7 @@
             <a:pPr algn="l"/>
             <a:r>
               <a:rPr lang="en-US" sz="3600"/>
-              <a:t>Answer 5 of 10 in week 2</a:t>
+              <a:t>Answer 5 of 10 in round 2</a:t>
             </a:r>
             <a:endParaRPr lang="en-US" sz="1100"/>
           </a:p>
@@ -6974,7 +6974,7 @@
             <a:pPr algn="l"/>
             <a:r>
               <a:rPr lang="en-US" sz="4400"/>
-              <a:t>Question 6 of 10 in week 2</a:t>
+              <a:t>Question 6 of 10 in round 2</a:t>
             </a:r>
             <a:endParaRPr lang="en-US" sz="1100"/>
           </a:p>
@@ -7002,7 +7002,7 @@
             <a:pPr algn="l"/>
             <a:r>
               <a:rPr lang="en-US" sz="3600"/>
-              <a:t>Answer 6 of 10 in week 2</a:t>
+              <a:t>Answer 6 of 10 in round 2</a:t>
             </a:r>
             <a:endParaRPr lang="en-US" sz="1100"/>
           </a:p>
@@ -7083,7 +7083,7 @@
             <a:pPr algn="l"/>
             <a:r>
               <a:rPr lang="en-US" sz="4400"/>
-              <a:t>Question 2 of 10 in week 1</a:t>
+              <a:t>Question 2 of 10 in round 1</a:t>
             </a:r>
             <a:endParaRPr lang="en-US" sz="1100"/>
           </a:p>
@@ -7111,7 +7111,7 @@
             <a:pPr algn="l"/>
             <a:r>
               <a:rPr lang="en-US" sz="3600"/>
-              <a:t>Answer 2 of 10 in week 1</a:t>
+              <a:t>Answer 2 of 10 in round 1</a:t>
             </a:r>
             <a:endParaRPr lang="en-US" sz="1100"/>
           </a:p>
@@ -7192,7 +7192,7 @@
             <a:pPr algn="l"/>
             <a:r>
               <a:rPr lang="en-US" sz="4400"/>
-              <a:t>Question 7 of 10 in week 2</a:t>
+              <a:t>Question 7 of 10 in round 2</a:t>
             </a:r>
             <a:endParaRPr lang="en-US" sz="1100"/>
           </a:p>
@@ -7220,7 +7220,7 @@
             <a:pPr algn="l"/>
             <a:r>
               <a:rPr lang="en-US" sz="3600"/>
-              <a:t>Answer 7 of 10 in week 2</a:t>
+              <a:t>Answer 7 of 10 in round 2</a:t>
             </a:r>
             <a:endParaRPr lang="en-US" sz="1100"/>
           </a:p>
@@ -7301,7 +7301,7 @@
             <a:pPr algn="l"/>
             <a:r>
               <a:rPr lang="en-US" sz="4400"/>
-              <a:t>Question 8 of 10 in week 2</a:t>
+              <a:t>Question 8 of 10 in round 2</a:t>
             </a:r>
             <a:endParaRPr lang="en-US" sz="1100"/>
           </a:p>
@@ -7329,7 +7329,7 @@
             <a:pPr algn="l"/>
             <a:r>
               <a:rPr lang="en-US" sz="3600"/>
-              <a:t>Answer 8 of 10 in week 2</a:t>
+              <a:t>Answer 8 of 10 in round 2</a:t>
             </a:r>
             <a:endParaRPr lang="en-US" sz="1100"/>
           </a:p>
@@ -7410,7 +7410,7 @@
             <a:pPr algn="l"/>
             <a:r>
               <a:rPr lang="en-US" sz="4400"/>
-              <a:t>Question 9 of 10 in week 2</a:t>
+              <a:t>Question 9 of 10 in round 2</a:t>
             </a:r>
             <a:endParaRPr lang="en-US" sz="1100"/>
           </a:p>
@@ -7438,7 +7438,7 @@
             <a:pPr algn="l"/>
             <a:r>
               <a:rPr lang="en-US" sz="3600"/>
-              <a:t>Answer 9 of 10 in week 2</a:t>
+              <a:t>Answer 9 of 10 in round 2</a:t>
             </a:r>
             <a:endParaRPr lang="en-US" sz="1100"/>
           </a:p>
@@ -7519,7 +7519,7 @@
             <a:pPr algn="l"/>
             <a:r>
               <a:rPr lang="en-US" sz="4400"/>
-              <a:t>Question 10 of 10 in week 2</a:t>
+              <a:t>Question 10 of 10 in round 2</a:t>
             </a:r>
             <a:endParaRPr lang="en-US" sz="1100"/>
           </a:p>
@@ -7547,7 +7547,7 @@
             <a:pPr algn="l"/>
             <a:r>
               <a:rPr lang="en-US" sz="3600"/>
-              <a:t>Answer 10 of 10 in week 2</a:t>
+              <a:t>Answer 10 of 10 in round 2</a:t>
             </a:r>
             <a:endParaRPr lang="en-US" sz="1100"/>
           </a:p>
@@ -7804,7 +7804,7 @@
             <a:pPr algn="l"/>
             <a:r>
               <a:rPr lang="en-US" sz="4400"/>
-              <a:t>Question 1 of 10 in week 3</a:t>
+              <a:t>Question 1 of 10 in round 3</a:t>
             </a:r>
             <a:endParaRPr lang="en-US" sz="1100"/>
           </a:p>
@@ -7832,7 +7832,7 @@
             <a:pPr algn="l"/>
             <a:r>
               <a:rPr lang="en-US" sz="3600"/>
-              <a:t>Answer 1 of 10 in week 3</a:t>
+              <a:t>Answer 1 of 10 in round 3</a:t>
             </a:r>
             <a:endParaRPr lang="en-US" sz="1100"/>
           </a:p>
@@ -7913,7 +7913,7 @@
             <a:pPr algn="l"/>
             <a:r>
               <a:rPr lang="en-US" sz="4400"/>
-              <a:t>Question 2 of 10 in week 3</a:t>
+              <a:t>Question 2 of 10 in round 3</a:t>
             </a:r>
             <a:endParaRPr lang="en-US" sz="1100"/>
           </a:p>
@@ -7941,7 +7941,7 @@
             <a:pPr algn="l"/>
             <a:r>
               <a:rPr lang="en-US" sz="3600"/>
-              <a:t>Answer 2 of 10 in week 3</a:t>
+              <a:t>Answer 2 of 10 in round 3</a:t>
             </a:r>
             <a:endParaRPr lang="en-US" sz="1100"/>
           </a:p>
@@ -8022,7 +8022,7 @@
             <a:pPr algn="l"/>
             <a:r>
               <a:rPr lang="en-US" sz="4400"/>
-              <a:t>Question 3 of 10 in week 3</a:t>
+              <a:t>Question 3 of 10 in round 3</a:t>
             </a:r>
             <a:endParaRPr lang="en-US" sz="1100"/>
           </a:p>
@@ -8050,7 +8050,7 @@
             <a:pPr algn="l"/>
             <a:r>
               <a:rPr lang="en-US" sz="3600"/>
-              <a:t>Answer 3 of 10 in week 3</a:t>
+              <a:t>Answer 3 of 10 in round 3</a:t>
             </a:r>
             <a:endParaRPr lang="en-US" sz="1100"/>
           </a:p>
@@ -8131,7 +8131,7 @@
             <a:pPr algn="l"/>
             <a:r>
               <a:rPr lang="en-US" sz="4400"/>
-              <a:t>Question 4 of 10 in week 3</a:t>
+              <a:t>Question 4 of 10 in round 3</a:t>
             </a:r>
             <a:endParaRPr lang="en-US" sz="1100"/>
           </a:p>
@@ -8159,7 +8159,7 @@
             <a:pPr algn="l"/>
             <a:r>
               <a:rPr lang="en-US" sz="3600"/>
-              <a:t>Answer 4 of 10 in week 3</a:t>
+              <a:t>Answer 4 of 10 in round 3</a:t>
             </a:r>
             <a:endParaRPr lang="en-US" sz="1100"/>
           </a:p>
@@ -8240,7 +8240,7 @@
             <a:pPr algn="l"/>
             <a:r>
               <a:rPr lang="en-US" sz="4400"/>
-              <a:t>Question 5 of 10 in week 3</a:t>
+              <a:t>Question 5 of 10 in round 3</a:t>
             </a:r>
             <a:endParaRPr lang="en-US" sz="1100"/>
           </a:p>
@@ -8268,7 +8268,7 @@
             <a:pPr algn="l"/>
             <a:r>
               <a:rPr lang="en-US" sz="3600"/>
-              <a:t>Answer 5 of 10 in week 3</a:t>
+              <a:t>Answer 5 of 10 in round 3</a:t>
             </a:r>
             <a:endParaRPr lang="en-US" sz="1100"/>
           </a:p>
@@ -8349,7 +8349,7 @@
             <a:pPr algn="l"/>
             <a:r>
               <a:rPr lang="en-US" sz="4400"/>
-              <a:t>Question 3 of 10 in week 1</a:t>
+              <a:t>Question 3 of 10 in round 1</a:t>
             </a:r>
             <a:endParaRPr lang="en-US" sz="1100"/>
           </a:p>
@@ -8377,7 +8377,7 @@
             <a:pPr algn="l"/>
             <a:r>
               <a:rPr lang="en-US" sz="3600"/>
-              <a:t>Answer 3 of 10 in week 1</a:t>
+              <a:t>Answer 3 of 10 in round 1</a:t>
             </a:r>
             <a:endParaRPr lang="en-US" sz="1100"/>
           </a:p>
@@ -8458,7 +8458,7 @@
             <a:pPr algn="l"/>
             <a:r>
               <a:rPr lang="en-US" sz="4400"/>
-              <a:t>Question 6 of 10 in week 3</a:t>
+              <a:t>Question 6 of 10 in round 3</a:t>
             </a:r>
             <a:endParaRPr lang="en-US" sz="1100"/>
           </a:p>
@@ -8486,7 +8486,7 @@
             <a:pPr algn="l"/>
             <a:r>
               <a:rPr lang="en-US" sz="3600"/>
-              <a:t>Answer 6 of 10 in week 3</a:t>
+              <a:t>Answer 6 of 10 in round 3</a:t>
             </a:r>
             <a:endParaRPr lang="en-US" sz="1100"/>
           </a:p>
@@ -8567,7 +8567,7 @@
             <a:pPr algn="l"/>
             <a:r>
               <a:rPr lang="en-US" sz="4400"/>
-              <a:t>Question 7 of 10 in week 3</a:t>
+              <a:t>Question 7 of 10 in round 3</a:t>
             </a:r>
             <a:endParaRPr lang="en-US" sz="1100"/>
           </a:p>
@@ -8595,7 +8595,7 @@
             <a:pPr algn="l"/>
             <a:r>
               <a:rPr lang="en-US" sz="3600"/>
-              <a:t>Answer 7 of 10 in week 3</a:t>
+              <a:t>Answer 7 of 10 in round 3</a:t>
             </a:r>
             <a:endParaRPr lang="en-US" sz="1100"/>
           </a:p>
@@ -8676,7 +8676,7 @@
             <a:pPr algn="l"/>
             <a:r>
               <a:rPr lang="en-US" sz="4400"/>
-              <a:t>Question 8 of 10 in week 3</a:t>
+              <a:t>Question 8 of 10 in round 3</a:t>
             </a:r>
             <a:endParaRPr lang="en-US" sz="1100"/>
           </a:p>
@@ -8704,7 +8704,7 @@
             <a:pPr algn="l"/>
             <a:r>
               <a:rPr lang="en-US" sz="3600"/>
-              <a:t>Answer 8 of 10 in week 3</a:t>
+              <a:t>Answer 8 of 10 in round 3</a:t>
             </a:r>
             <a:endParaRPr lang="en-US" sz="1100"/>
           </a:p>
@@ -8785,7 +8785,7 @@
             <a:pPr algn="l"/>
             <a:r>
               <a:rPr lang="en-US" sz="4400"/>
-              <a:t>Question 9 of 10 in week 3</a:t>
+              <a:t>Question 9 of 10 in round 3</a:t>
             </a:r>
             <a:endParaRPr lang="en-US" sz="1100"/>
           </a:p>
@@ -8813,7 +8813,7 @@
             <a:pPr algn="l"/>
             <a:r>
               <a:rPr lang="en-US" sz="3600"/>
-              <a:t>Answer 9 of 10 in week 3</a:t>
+              <a:t>Answer 9 of 10 in round 3</a:t>
             </a:r>
             <a:endParaRPr lang="en-US" sz="1100"/>
           </a:p>
@@ -8894,7 +8894,7 @@
             <a:pPr algn="l"/>
             <a:r>
               <a:rPr lang="en-US" sz="4400"/>
-              <a:t>Question 10 of 10 in week 3</a:t>
+              <a:t>Question 10 of 10 in round 3</a:t>
             </a:r>
             <a:endParaRPr lang="en-US" sz="1100"/>
           </a:p>
@@ -8922,7 +8922,7 @@
             <a:pPr algn="l"/>
             <a:r>
               <a:rPr lang="en-US" sz="3600"/>
-              <a:t>Answer 10 of 10 in week 3</a:t>
+              <a:t>Answer 10 of 10 in round 3</a:t>
             </a:r>
             <a:endParaRPr lang="en-US" sz="1100"/>
           </a:p>
@@ -9179,7 +9179,7 @@
             <a:pPr algn="l"/>
             <a:r>
               <a:rPr lang="en-US" sz="4400"/>
-              <a:t>Question 1 of 10 in week 4</a:t>
+              <a:t>Question 1 of 10 in round 4</a:t>
             </a:r>
             <a:endParaRPr lang="en-US" sz="1100"/>
           </a:p>
@@ -9207,7 +9207,7 @@
             <a:pPr algn="l"/>
             <a:r>
               <a:rPr lang="en-US" sz="3600"/>
-              <a:t>Answer 1 of 10 in week 4</a:t>
+              <a:t>Answer 1 of 10 in round 4</a:t>
             </a:r>
             <a:endParaRPr lang="en-US" sz="1100"/>
           </a:p>
@@ -9288,7 +9288,7 @@
             <a:pPr algn="l"/>
             <a:r>
               <a:rPr lang="en-US" sz="4400"/>
-              <a:t>Question 2 of 10 in week 4</a:t>
+              <a:t>Question 2 of 10 in round 4</a:t>
             </a:r>
             <a:endParaRPr lang="en-US" sz="1100"/>
           </a:p>
@@ -9316,7 +9316,7 @@
             <a:pPr algn="l"/>
             <a:r>
               <a:rPr lang="en-US" sz="3600"/>
-              <a:t>Answer 2 of 10 in week 4</a:t>
+              <a:t>Answer 2 of 10 in round 4</a:t>
             </a:r>
             <a:endParaRPr lang="en-US" sz="1100"/>
           </a:p>
@@ -9397,7 +9397,7 @@
             <a:pPr algn="l"/>
             <a:r>
               <a:rPr lang="en-US" sz="4400"/>
-              <a:t>Question 3 of 10 in week 4</a:t>
+              <a:t>Question 3 of 10 in round 4</a:t>
             </a:r>
             <a:endParaRPr lang="en-US" sz="1100"/>
           </a:p>
@@ -9425,7 +9425,7 @@
             <a:pPr algn="l"/>
             <a:r>
               <a:rPr lang="en-US" sz="3600"/>
-              <a:t>Answer 3 of 10 in week 4</a:t>
+              <a:t>Answer 3 of 10 in round 4</a:t>
             </a:r>
             <a:endParaRPr lang="en-US" sz="1100"/>
           </a:p>
@@ -9506,7 +9506,7 @@
             <a:pPr algn="l"/>
             <a:r>
               <a:rPr lang="en-US" sz="4400"/>
-              <a:t>Question 4 of 10 in week 4</a:t>
+              <a:t>Question 4 of 10 in round 4</a:t>
             </a:r>
             <a:endParaRPr lang="en-US" sz="1100"/>
           </a:p>
@@ -9534,7 +9534,7 @@
             <a:pPr algn="l"/>
             <a:r>
               <a:rPr lang="en-US" sz="3600"/>
-              <a:t>Answer 4 of 10 in week 4</a:t>
+              <a:t>Answer 4 of 10 in round 4</a:t>
             </a:r>
             <a:endParaRPr lang="en-US" sz="1100"/>
           </a:p>
@@ -9615,7 +9615,7 @@
             <a:pPr algn="l"/>
             <a:r>
               <a:rPr lang="en-US" sz="4400"/>
-              <a:t>Question 4 of 10 in week 1</a:t>
+              <a:t>Question 4 of 10 in round 1</a:t>
             </a:r>
             <a:endParaRPr lang="en-US" sz="1100"/>
           </a:p>
@@ -9643,7 +9643,7 @@
             <a:pPr algn="l"/>
             <a:r>
               <a:rPr lang="en-US" sz="3600"/>
-              <a:t>Answer 4 of 10 in week 1</a:t>
+              <a:t>Answer 4 of 10 in round 1</a:t>
             </a:r>
             <a:endParaRPr lang="en-US" sz="1100"/>
           </a:p>
@@ -9724,7 +9724,7 @@
             <a:pPr algn="l"/>
             <a:r>
               <a:rPr lang="en-US" sz="4400"/>
-              <a:t>Question 5 of 10 in week 4</a:t>
+              <a:t>Question 5 of 10 in round 4</a:t>
             </a:r>
             <a:endParaRPr lang="en-US" sz="1100"/>
           </a:p>
@@ -9752,7 +9752,7 @@
             <a:pPr algn="l"/>
             <a:r>
               <a:rPr lang="en-US" sz="3600"/>
-              <a:t>Answer 5 of 10 in week 4</a:t>
+              <a:t>Answer 5 of 10 in round 4</a:t>
             </a:r>
             <a:endParaRPr lang="en-US" sz="1100"/>
           </a:p>
@@ -9833,7 +9833,7 @@
             <a:pPr algn="l"/>
             <a:r>
               <a:rPr lang="en-US" sz="4400"/>
-              <a:t>Question 6 of 10 in week 4</a:t>
+              <a:t>Question 6 of 10 in round 4</a:t>
             </a:r>
             <a:endParaRPr lang="en-US" sz="1100"/>
           </a:p>
@@ -9861,7 +9861,7 @@
             <a:pPr algn="l"/>
             <a:r>
               <a:rPr lang="en-US" sz="3600"/>
-              <a:t>Answer 6 of 10 in week 4</a:t>
+              <a:t>Answer 6 of 10 in round 4</a:t>
             </a:r>
             <a:endParaRPr lang="en-US" sz="1100"/>
           </a:p>
@@ -9942,7 +9942,7 @@
             <a:pPr algn="l"/>
             <a:r>
               <a:rPr lang="en-US" sz="4400"/>
-              <a:t>Question 7 of 10 in week 4</a:t>
+              <a:t>Question 7 of 10 in round 4</a:t>
             </a:r>
             <a:endParaRPr lang="en-US" sz="1100"/>
           </a:p>
@@ -9970,7 +9970,7 @@
             <a:pPr algn="l"/>
             <a:r>
               <a:rPr lang="en-US" sz="3600"/>
-              <a:t>Answer 7 of 10 in week 4</a:t>
+              <a:t>Answer 7 of 10 in round 4</a:t>
             </a:r>
             <a:endParaRPr lang="en-US" sz="1100"/>
           </a:p>
@@ -10051,7 +10051,7 @@
             <a:pPr algn="l"/>
             <a:r>
               <a:rPr lang="en-US" sz="4400"/>
-              <a:t>Question 8 of 10 in week 4</a:t>
+              <a:t>Question 8 of 10 in round 4</a:t>
             </a:r>
             <a:endParaRPr lang="en-US" sz="1100"/>
           </a:p>
@@ -10079,7 +10079,7 @@
             <a:pPr algn="l"/>
             <a:r>
               <a:rPr lang="en-US" sz="3600"/>
-              <a:t>Answer 8 of 10 in week 4</a:t>
+              <a:t>Answer 8 of 10 in round 4</a:t>
             </a:r>
             <a:endParaRPr lang="en-US" sz="1100"/>
           </a:p>
@@ -10160,7 +10160,7 @@
             <a:pPr algn="l"/>
             <a:r>
               <a:rPr lang="en-US" sz="4400"/>
-              <a:t>Question 9 of 10 in week 4</a:t>
+              <a:t>Question 9 of 10 in round 4</a:t>
             </a:r>
             <a:endParaRPr lang="en-US" sz="1100"/>
           </a:p>
@@ -10188,7 +10188,7 @@
             <a:pPr algn="l"/>
             <a:r>
               <a:rPr lang="en-US" sz="3600"/>
-              <a:t>Answer 9 of 10 in week 4</a:t>
+              <a:t>Answer 9 of 10 in round 4</a:t>
             </a:r>
             <a:endParaRPr lang="en-US" sz="1100"/>
           </a:p>
@@ -10269,7 +10269,7 @@
             <a:pPr algn="l"/>
             <a:r>
               <a:rPr lang="en-US" sz="4400"/>
-              <a:t>Question 10 of 10 in week 4</a:t>
+              <a:t>Question 10 of 10 in round 4</a:t>
             </a:r>
             <a:endParaRPr lang="en-US" sz="1100"/>
           </a:p>
@@ -10297,7 +10297,7 @@
             <a:pPr algn="l"/>
             <a:r>
               <a:rPr lang="en-US" sz="3600"/>
-              <a:t>Answer 10 of 10 in week 4</a:t>
+              <a:t>Answer 10 of 10 in round 4</a:t>
             </a:r>
             <a:endParaRPr lang="en-US" sz="1100"/>
           </a:p>
@@ -10554,7 +10554,7 @@
             <a:pPr algn="l"/>
             <a:r>
               <a:rPr lang="en-US" sz="4400"/>
-              <a:t>Question 1 of 10 in week 5</a:t>
+              <a:t>Question 1 of 10 in round 5</a:t>
             </a:r>
             <a:endParaRPr lang="en-US" sz="1100"/>
           </a:p>
@@ -10582,7 +10582,7 @@
             <a:pPr algn="l"/>
             <a:r>
               <a:rPr lang="en-US" sz="3600"/>
-              <a:t>Answer 1 of 10 in week 5</a:t>
+              <a:t>Answer 1 of 10 in round 5</a:t>
             </a:r>
             <a:endParaRPr lang="en-US" sz="1100"/>
           </a:p>
@@ -10663,7 +10663,7 @@
             <a:pPr algn="l"/>
             <a:r>
               <a:rPr lang="en-US" sz="4400"/>
-              <a:t>Question 2 of 10 in week 5</a:t>
+              <a:t>Question 2 of 10 in round 5</a:t>
             </a:r>
             <a:endParaRPr lang="en-US" sz="1100"/>
           </a:p>
@@ -10691,7 +10691,7 @@
             <a:pPr algn="l"/>
             <a:r>
               <a:rPr lang="en-US" sz="3600"/>
-              <a:t>Answer 2 of 10 in week 5</a:t>
+              <a:t>Answer 2 of 10 in round 5</a:t>
             </a:r>
             <a:endParaRPr lang="en-US" sz="1100"/>
           </a:p>
@@ -10772,7 +10772,7 @@
             <a:pPr algn="l"/>
             <a:r>
               <a:rPr lang="en-US" sz="4400"/>
-              <a:t>Question 3 of 10 in week 5</a:t>
+              <a:t>Question 3 of 10 in round 5</a:t>
             </a:r>
             <a:endParaRPr lang="en-US" sz="1100"/>
           </a:p>
@@ -10800,7 +10800,7 @@
             <a:pPr algn="l"/>
             <a:r>
               <a:rPr lang="en-US" sz="3600"/>
-              <a:t>Answer 3 of 10 in week 5</a:t>
+              <a:t>Answer 3 of 10 in round 5</a:t>
             </a:r>
             <a:endParaRPr lang="en-US" sz="1100"/>
           </a:p>
@@ -10881,7 +10881,7 @@
             <a:pPr algn="l"/>
             <a:r>
               <a:rPr lang="en-US" sz="4400"/>
-              <a:t>Question 5 of 10 in week 1</a:t>
+              <a:t>Question 5 of 10 in round 1</a:t>
             </a:r>
             <a:endParaRPr lang="en-US" sz="1100"/>
           </a:p>
@@ -10909,7 +10909,7 @@
             <a:pPr algn="l"/>
             <a:r>
               <a:rPr lang="en-US" sz="3600"/>
-              <a:t>Answer 5 of 10 in week 1</a:t>
+              <a:t>Answer 5 of 10 in round 1</a:t>
             </a:r>
             <a:endParaRPr lang="en-US" sz="1100"/>
           </a:p>
@@ -10990,7 +10990,7 @@
             <a:pPr algn="l"/>
             <a:r>
               <a:rPr lang="en-US" sz="4400"/>
-              <a:t>Question 4 of 10 in week 5</a:t>
+              <a:t>Question 4 of 10 in round 5</a:t>
             </a:r>
             <a:endParaRPr lang="en-US" sz="1100"/>
           </a:p>
@@ -11018,7 +11018,7 @@
             <a:pPr algn="l"/>
             <a:r>
               <a:rPr lang="en-US" sz="3600"/>
-              <a:t>Answer 4 of 10 in week 5</a:t>
+              <a:t>Answer 4 of 10 in round 5</a:t>
             </a:r>
             <a:endParaRPr lang="en-US" sz="1100"/>
           </a:p>
@@ -11099,7 +11099,7 @@
             <a:pPr algn="l"/>
             <a:r>
               <a:rPr lang="en-US" sz="4400"/>
-              <a:t>Question 5 of 10 in week 5</a:t>
+              <a:t>Question 5 of 10 in round 5</a:t>
             </a:r>
             <a:endParaRPr lang="en-US" sz="1100"/>
           </a:p>
@@ -11127,7 +11127,7 @@
             <a:pPr algn="l"/>
             <a:r>
               <a:rPr lang="en-US" sz="3600"/>
-              <a:t>Answer 5 of 10 in week 5</a:t>
+              <a:t>Answer 5 of 10 in round 5</a:t>
             </a:r>
             <a:endParaRPr lang="en-US" sz="1100"/>
           </a:p>
@@ -11208,7 +11208,7 @@
             <a:pPr algn="l"/>
             <a:r>
               <a:rPr lang="en-US" sz="4400"/>
-              <a:t>Question 6 of 10 in week 5</a:t>
+              <a:t>Question 6 of 10 in round 5</a:t>
             </a:r>
             <a:endParaRPr lang="en-US" sz="1100"/>
           </a:p>
@@ -11236,7 +11236,7 @@
             <a:pPr algn="l"/>
             <a:r>
               <a:rPr lang="en-US" sz="3600"/>
-              <a:t>Answer 6 of 10 in week 5</a:t>
+              <a:t>Answer 6 of 10 in round 5</a:t>
             </a:r>
             <a:endParaRPr lang="en-US" sz="1100"/>
           </a:p>
@@ -11317,7 +11317,7 @@
             <a:pPr algn="l"/>
             <a:r>
               <a:rPr lang="en-US" sz="4400"/>
-              <a:t>Question 7 of 10 in week 5</a:t>
+              <a:t>Question 7 of 10 in round 5</a:t>
             </a:r>
             <a:endParaRPr lang="en-US" sz="1100"/>
           </a:p>
@@ -11345,7 +11345,7 @@
             <a:pPr algn="l"/>
             <a:r>
               <a:rPr lang="en-US" sz="3600"/>
-              <a:t>Answer 7 of 10 in week 5</a:t>
+              <a:t>Answer 7 of 10 in round 5</a:t>
             </a:r>
             <a:endParaRPr lang="en-US" sz="1100"/>
           </a:p>
@@ -11426,7 +11426,7 @@
             <a:pPr algn="l"/>
             <a:r>
               <a:rPr lang="en-US" sz="4400"/>
-              <a:t>Question 8 of 10 in week 5</a:t>
+              <a:t>Question 8 of 10 in round 5</a:t>
             </a:r>
             <a:endParaRPr lang="en-US" sz="1100"/>
           </a:p>
@@ -11454,7 +11454,7 @@
             <a:pPr algn="l"/>
             <a:r>
               <a:rPr lang="en-US" sz="3600"/>
-              <a:t>Answer 8 of 10 in week 5</a:t>
+              <a:t>Answer 8 of 10 in round 5</a:t>
             </a:r>
             <a:endParaRPr lang="en-US" sz="1100"/>
           </a:p>
@@ -11535,7 +11535,7 @@
             <a:pPr algn="l"/>
             <a:r>
               <a:rPr lang="en-US" sz="4400"/>
-              <a:t>Question 9 of 10 in week 5</a:t>
+              <a:t>Question 9 of 10 in round 5</a:t>
             </a:r>
             <a:endParaRPr lang="en-US" sz="1100"/>
           </a:p>
@@ -11563,7 +11563,7 @@
             <a:pPr algn="l"/>
             <a:r>
               <a:rPr lang="en-US" sz="3600"/>
-              <a:t>Answer 9 of 10 in week 5</a:t>
+              <a:t>Answer 9 of 10 in round 5</a:t>
             </a:r>
             <a:endParaRPr lang="en-US" sz="1100"/>
           </a:p>
@@ -11644,7 +11644,7 @@
             <a:pPr algn="l"/>
             <a:r>
               <a:rPr lang="en-US" sz="4400"/>
-              <a:t>Question 10 of 10 in week 5</a:t>
+              <a:t>Question 10 of 10 in round 5</a:t>
             </a:r>
             <a:endParaRPr lang="en-US" sz="1100"/>
           </a:p>
@@ -11672,7 +11672,7 @@
             <a:pPr algn="l"/>
             <a:r>
               <a:rPr lang="en-US" sz="3600"/>
-              <a:t>Answer 10 of 10 in week 5</a:t>
+              <a:t>Answer 10 of 10 in round 5</a:t>
             </a:r>
             <a:endParaRPr lang="en-US" sz="1100"/>
           </a:p>
@@ -11929,7 +11929,7 @@
             <a:pPr algn="l"/>
             <a:r>
               <a:rPr lang="en-US" sz="4400"/>
-              <a:t>Question 1 of 10 in week 6</a:t>
+              <a:t>Question 1 of 10 in round 6</a:t>
             </a:r>
             <a:endParaRPr lang="en-US" sz="1100"/>
           </a:p>
@@ -11957,7 +11957,7 @@
             <a:pPr algn="l"/>
             <a:r>
               <a:rPr lang="en-US" sz="3600"/>
-              <a:t>Answer 1 of 10 in week 6</a:t>
+              <a:t>Answer 1 of 10 in round 6</a:t>
             </a:r>
             <a:endParaRPr lang="en-US" sz="1100"/>
           </a:p>
@@ -12038,7 +12038,7 @@
             <a:pPr algn="l"/>
             <a:r>
               <a:rPr lang="en-US" sz="4400"/>
-              <a:t>Question 2 of 10 in week 6</a:t>
+              <a:t>Question 2 of 10 in round 6</a:t>
             </a:r>
             <a:endParaRPr lang="en-US" sz="1100"/>
           </a:p>
@@ -12066,7 +12066,7 @@
             <a:pPr algn="l"/>
             <a:r>
               <a:rPr lang="en-US" sz="3600"/>
-              <a:t>Answer 2 of 10 in week 6</a:t>
+              <a:t>Answer 2 of 10 in round 6</a:t>
             </a:r>
             <a:endParaRPr lang="en-US" sz="1100"/>
           </a:p>
@@ -12147,7 +12147,7 @@
             <a:pPr algn="l"/>
             <a:r>
               <a:rPr lang="en-US" sz="4400"/>
-              <a:t>Question 6 of 10 in week 1</a:t>
+              <a:t>Question 6 of 10 in round 1</a:t>
             </a:r>
             <a:endParaRPr lang="en-US" sz="1100"/>
           </a:p>
@@ -12175,7 +12175,7 @@
             <a:pPr algn="l"/>
             <a:r>
               <a:rPr lang="en-US" sz="3600"/>
-              <a:t>Answer 6 of 10 in week 1</a:t>
+              <a:t>Answer 6 of 10 in round 1</a:t>
             </a:r>
             <a:endParaRPr lang="en-US" sz="1100"/>
           </a:p>
@@ -12256,7 +12256,7 @@
             <a:pPr algn="l"/>
             <a:r>
               <a:rPr lang="en-US" sz="4400"/>
-              <a:t>Question 3 of 10 in week 6</a:t>
+              <a:t>Question 3 of 10 in round 6</a:t>
             </a:r>
             <a:endParaRPr lang="en-US" sz="1100"/>
           </a:p>
@@ -12284,7 +12284,7 @@
             <a:pPr algn="l"/>
             <a:r>
               <a:rPr lang="en-US" sz="3600"/>
-              <a:t>Answer 3 of 10 in week 6</a:t>
+              <a:t>Answer 3 of 10 in round 6</a:t>
             </a:r>
             <a:endParaRPr lang="en-US" sz="1100"/>
           </a:p>
@@ -12365,7 +12365,7 @@
             <a:pPr algn="l"/>
             <a:r>
               <a:rPr lang="en-US" sz="4400"/>
-              <a:t>Question 4 of 10 in week 6</a:t>
+              <a:t>Question 4 of 10 in round 6</a:t>
             </a:r>
             <a:endParaRPr lang="en-US" sz="1100"/>
           </a:p>
@@ -12393,7 +12393,7 @@
             <a:pPr algn="l"/>
             <a:r>
               <a:rPr lang="en-US" sz="3600"/>
-              <a:t>Answer 4 of 10 in week 6</a:t>
+              <a:t>Answer 4 of 10 in round 6</a:t>
             </a:r>
             <a:endParaRPr lang="en-US" sz="1100"/>
           </a:p>
@@ -12474,7 +12474,7 @@
             <a:pPr algn="l"/>
             <a:r>
               <a:rPr lang="en-US" sz="4400"/>
-              <a:t>Question 5 of 10 in week 6</a:t>
+              <a:t>Question 5 of 10 in round 6</a:t>
             </a:r>
             <a:endParaRPr lang="en-US" sz="1100"/>
           </a:p>
@@ -12502,7 +12502,7 @@
             <a:pPr algn="l"/>
             <a:r>
               <a:rPr lang="en-US" sz="3600"/>
-              <a:t>Answer 5 of 10 in week 6</a:t>
+              <a:t>Answer 5 of 10 in round 6</a:t>
             </a:r>
             <a:endParaRPr lang="en-US" sz="1100"/>
           </a:p>
@@ -12583,7 +12583,7 @@
             <a:pPr algn="l"/>
             <a:r>
               <a:rPr lang="en-US" sz="4400"/>
-              <a:t>Question 6 of 10 in week 6</a:t>
+              <a:t>Question 6 of 10 in round 6</a:t>
             </a:r>
             <a:endParaRPr lang="en-US" sz="1100"/>
           </a:p>
@@ -12611,7 +12611,7 @@
             <a:pPr algn="l"/>
             <a:r>
               <a:rPr lang="en-US" sz="3600"/>
-              <a:t>Answer 6 of 10 in week 6</a:t>
+              <a:t>Answer 6 of 10 in round 6</a:t>
             </a:r>
             <a:endParaRPr lang="en-US" sz="1100"/>
           </a:p>
@@ -12692,7 +12692,7 @@
             <a:pPr algn="l"/>
             <a:r>
               <a:rPr lang="en-US" sz="4400"/>
-              <a:t>Question 7 of 10 in week 6</a:t>
+              <a:t>Question 7 of 10 in round 6</a:t>
             </a:r>
             <a:endParaRPr lang="en-US" sz="1100"/>
           </a:p>
@@ -12720,7 +12720,7 @@
             <a:pPr algn="l"/>
             <a:r>
               <a:rPr lang="en-US" sz="3600"/>
-              <a:t>Answer 7 of 10 in week 6</a:t>
+              <a:t>Answer 7 of 10 in round 6</a:t>
             </a:r>
             <a:endParaRPr lang="en-US" sz="1100"/>
           </a:p>
@@ -12801,7 +12801,7 @@
             <a:pPr algn="l"/>
             <a:r>
               <a:rPr lang="en-US" sz="4400"/>
-              <a:t>Question 8 of 10 in week 6</a:t>
+              <a:t>Question 8 of 10 in round 6</a:t>
             </a:r>
             <a:endParaRPr lang="en-US" sz="1100"/>
           </a:p>
@@ -12829,7 +12829,7 @@
             <a:pPr algn="l"/>
             <a:r>
               <a:rPr lang="en-US" sz="3600"/>
-              <a:t>Answer 8 of 10 in week 6</a:t>
+              <a:t>Answer 8 of 10 in round 6</a:t>
             </a:r>
             <a:endParaRPr lang="en-US" sz="1100"/>
           </a:p>
@@ -12910,7 +12910,7 @@
             <a:pPr algn="l"/>
             <a:r>
               <a:rPr lang="en-US" sz="4400"/>
-              <a:t>Question 9 of 10 in week 6</a:t>
+              <a:t>Question 9 of 10 in round 6</a:t>
             </a:r>
             <a:endParaRPr lang="en-US" sz="1100"/>
           </a:p>
@@ -12938,7 +12938,7 @@
             <a:pPr algn="l"/>
             <a:r>
               <a:rPr lang="en-US" sz="3600"/>
-              <a:t>Answer 9 of 10 in week 6</a:t>
+              <a:t>Answer 9 of 10 in round 6</a:t>
             </a:r>
             <a:endParaRPr lang="en-US" sz="1100"/>
           </a:p>
@@ -13019,7 +13019,7 @@
             <a:pPr algn="l"/>
             <a:r>
               <a:rPr lang="en-US" sz="4400"/>
-              <a:t>Question 10 of 10 in week 6</a:t>
+              <a:t>Question 10 of 10 in round 6</a:t>
             </a:r>
             <a:endParaRPr lang="en-US" sz="1100"/>
           </a:p>
@@ -13047,7 +13047,7 @@
             <a:pPr algn="l"/>
             <a:r>
               <a:rPr lang="en-US" sz="3600"/>
-              <a:t>Answer 10 of 10 in week 6</a:t>
+              <a:t>Answer 10 of 10 in round 6</a:t>
             </a:r>
             <a:endParaRPr lang="en-US" sz="1100"/>
           </a:p>
@@ -13304,7 +13304,7 @@
             <a:pPr algn="l"/>
             <a:r>
               <a:rPr lang="en-US" sz="4400"/>
-              <a:t>Question 1 of 10 in week 7</a:t>
+              <a:t>Question 1 of 10 in round 7</a:t>
             </a:r>
             <a:endParaRPr lang="en-US" sz="1100"/>
           </a:p>
@@ -13332,7 +13332,7 @@
             <a:pPr algn="l"/>
             <a:r>
               <a:rPr lang="en-US" sz="3600"/>
-              <a:t>Answer 1 of 10 in week 7</a:t>
+              <a:t>Answer 1 of 10 in round 7</a:t>
             </a:r>
             <a:endParaRPr lang="en-US" sz="1100"/>
           </a:p>
@@ -13413,7 +13413,7 @@
             <a:pPr algn="l"/>
             <a:r>
               <a:rPr lang="en-US" sz="4400"/>
-              <a:t>Question 7 of 10 in week 1</a:t>
+              <a:t>Question 7 of 10 in round 1</a:t>
             </a:r>
             <a:endParaRPr lang="en-US" sz="1100"/>
           </a:p>
@@ -13441,7 +13441,7 @@
             <a:pPr algn="l"/>
             <a:r>
               <a:rPr lang="en-US" sz="3600"/>
-              <a:t>Answer 7 of 10 in week 1</a:t>
+              <a:t>Answer 7 of 10 in round 1</a:t>
             </a:r>
             <a:endParaRPr lang="en-US" sz="1100"/>
           </a:p>
@@ -13522,7 +13522,7 @@
             <a:pPr algn="l"/>
             <a:r>
               <a:rPr lang="en-US" sz="4400"/>
-              <a:t>Question 2 of 10 in week 7</a:t>
+              <a:t>Question 2 of 10 in round 7</a:t>
             </a:r>
             <a:endParaRPr lang="en-US" sz="1100"/>
           </a:p>
@@ -13550,7 +13550,7 @@
             <a:pPr algn="l"/>
             <a:r>
               <a:rPr lang="en-US" sz="3600"/>
-              <a:t>Answer 2 of 10 in week 7</a:t>
+              <a:t>Answer 2 of 10 in round 7</a:t>
             </a:r>
             <a:endParaRPr lang="en-US" sz="1100"/>
           </a:p>
@@ -13631,7 +13631,7 @@
             <a:pPr algn="l"/>
             <a:r>
               <a:rPr lang="en-US" sz="4400"/>
-              <a:t>Question 3 of 10 in week 7</a:t>
+              <a:t>Question 3 of 10 in round 7</a:t>
             </a:r>
             <a:endParaRPr lang="en-US" sz="1100"/>
           </a:p>
@@ -13659,7 +13659,7 @@
             <a:pPr algn="l"/>
             <a:r>
               <a:rPr lang="en-US" sz="3600"/>
-              <a:t>Answer 3 of 10 in week 7</a:t>
+              <a:t>Answer 3 of 10 in round 7</a:t>
             </a:r>
             <a:endParaRPr lang="en-US" sz="1100"/>
           </a:p>
@@ -13740,7 +13740,7 @@
             <a:pPr algn="l"/>
             <a:r>
               <a:rPr lang="en-US" sz="4400"/>
-              <a:t>Question 4 of 10 in week 7</a:t>
+              <a:t>Question 4 of 10 in round 7</a:t>
             </a:r>
             <a:endParaRPr lang="en-US" sz="1100"/>
           </a:p>
@@ -13768,7 +13768,7 @@
             <a:pPr algn="l"/>
             <a:r>
               <a:rPr lang="en-US" sz="3600"/>
-              <a:t>Answer 4 of 10 in week 7</a:t>
+              <a:t>Answer 4 of 10 in round 7</a:t>
             </a:r>
             <a:endParaRPr lang="en-US" sz="1100"/>
           </a:p>
@@ -13849,7 +13849,7 @@
             <a:pPr algn="l"/>
             <a:r>
               <a:rPr lang="en-US" sz="4400"/>
-              <a:t>Question 5 of 10 in week 7</a:t>
+              <a:t>Question 5 of 10 in round 7</a:t>
             </a:r>
             <a:endParaRPr lang="en-US" sz="1100"/>
           </a:p>
@@ -13877,7 +13877,7 @@
             <a:pPr algn="l"/>
             <a:r>
               <a:rPr lang="en-US" sz="3600"/>
-              <a:t>Answer 5 of 10 in week 7</a:t>
+              <a:t>Answer 5 of 10 in round 7</a:t>
             </a:r>
             <a:endParaRPr lang="en-US" sz="1100"/>
           </a:p>
@@ -13958,7 +13958,7 @@
             <a:pPr algn="l"/>
             <a:r>
               <a:rPr lang="en-US" sz="4400"/>
-              <a:t>Question 6 of 10 in week 7</a:t>
+              <a:t>Question 6 of 10 in round 7</a:t>
             </a:r>
             <a:endParaRPr lang="en-US" sz="1100"/>
           </a:p>
@@ -13986,7 +13986,7 @@
             <a:pPr algn="l"/>
             <a:r>
               <a:rPr lang="en-US" sz="3600"/>
-              <a:t>Answer 6 of 10 in week 7</a:t>
+              <a:t>Answer 6 of 10 in round 7</a:t>
             </a:r>
             <a:endParaRPr lang="en-US" sz="1100"/>
           </a:p>
@@ -14067,7 +14067,7 @@
             <a:pPr algn="l"/>
             <a:r>
               <a:rPr lang="en-US" sz="4400"/>
-              <a:t>Question 7 of 10 in week 7</a:t>
+              <a:t>Question 7 of 10 in round 7</a:t>
             </a:r>
             <a:endParaRPr lang="en-US" sz="1100"/>
           </a:p>
@@ -14095,7 +14095,7 @@
             <a:pPr algn="l"/>
             <a:r>
               <a:rPr lang="en-US" sz="3600"/>
-              <a:t>Answer 7 of 10 in week 7</a:t>
+              <a:t>Answer 7 of 10 in round 7</a:t>
             </a:r>
             <a:endParaRPr lang="en-US" sz="1100"/>
           </a:p>
@@ -14176,7 +14176,7 @@
             <a:pPr algn="l"/>
             <a:r>
               <a:rPr lang="en-US" sz="4400"/>
-              <a:t>Question 8 of 10 in week 7</a:t>
+              <a:t>Question 8 of 10 in round 7</a:t>
             </a:r>
             <a:endParaRPr lang="en-US" sz="1100"/>
           </a:p>
@@ -14204,7 +14204,7 @@
             <a:pPr algn="l"/>
             <a:r>
               <a:rPr lang="en-US" sz="3600"/>
-              <a:t>Answer 8 of 10 in week 7</a:t>
+              <a:t>Answer 8 of 10 in round 7</a:t>
             </a:r>
             <a:endParaRPr lang="en-US" sz="1100"/>
           </a:p>
@@ -14285,7 +14285,7 @@
             <a:pPr algn="l"/>
             <a:r>
               <a:rPr lang="en-US" sz="4400"/>
-              <a:t>Question 9 of 10 in week 7</a:t>
+              <a:t>Question 9 of 10 in round 7</a:t>
             </a:r>
             <a:endParaRPr lang="en-US" sz="1100"/>
           </a:p>
@@ -14313,7 +14313,7 @@
             <a:pPr algn="l"/>
             <a:r>
               <a:rPr lang="en-US" sz="3600"/>
-              <a:t>Answer 9 of 10 in week 7</a:t>
+              <a:t>Answer 9 of 10 in round 7</a:t>
             </a:r>
             <a:endParaRPr lang="en-US" sz="1100"/>
           </a:p>
@@ -14394,7 +14394,7 @@
             <a:pPr algn="l"/>
             <a:r>
               <a:rPr lang="en-US" sz="4400"/>
-              <a:t>Question 10 of 10 in week 7</a:t>
+              <a:t>Question 10 of 10 in round 7</a:t>
             </a:r>
             <a:endParaRPr lang="en-US" sz="1100"/>
           </a:p>
@@ -14422,7 +14422,7 @@
             <a:pPr algn="l"/>
             <a:r>
               <a:rPr lang="en-US" sz="3600"/>
-              <a:t>Answer 10 of 10 in week 7</a:t>
+              <a:t>Answer 10 of 10 in round 7</a:t>
             </a:r>
             <a:endParaRPr lang="en-US" sz="1100"/>
           </a:p>
@@ -14679,7 +14679,7 @@
             <a:pPr algn="l"/>
             <a:r>
               <a:rPr lang="en-US" sz="4400"/>
-              <a:t>Question 8 of 10 in week 1</a:t>
+              <a:t>Question 8 of 10 in round 1</a:t>
             </a:r>
             <a:endParaRPr lang="en-US" sz="1100"/>
           </a:p>
@@ -14707,7 +14707,7 @@
             <a:pPr algn="l"/>
             <a:r>
               <a:rPr lang="en-US" sz="3600"/>
-              <a:t>Answer 8 of 10 in week 1</a:t>
+              <a:t>Answer 8 of 10 in round 1</a:t>
             </a:r>
             <a:endParaRPr lang="en-US" sz="1100"/>
           </a:p>
@@ -14788,7 +14788,7 @@
             <a:pPr algn="l"/>
             <a:r>
               <a:rPr lang="en-US" sz="4400"/>
-              <a:t>Question 1 of 10 in week 8</a:t>
+              <a:t>Question 1 of 10 in round 8</a:t>
             </a:r>
             <a:endParaRPr lang="en-US" sz="1100"/>
           </a:p>
@@ -14816,7 +14816,7 @@
             <a:pPr algn="l"/>
             <a:r>
               <a:rPr lang="en-US" sz="3600"/>
-              <a:t>Answer 1 of 10 in week 8</a:t>
+              <a:t>Answer 1 of 10 in round 8</a:t>
             </a:r>
             <a:endParaRPr lang="en-US" sz="1100"/>
           </a:p>
@@ -14897,7 +14897,7 @@
             <a:pPr algn="l"/>
             <a:r>
               <a:rPr lang="en-US" sz="4400"/>
-              <a:t>Question 2 of 10 in week 8</a:t>
+              <a:t>Question 2 of 10 in round 8</a:t>
             </a:r>
             <a:endParaRPr lang="en-US" sz="1100"/>
           </a:p>
@@ -14925,7 +14925,7 @@
             <a:pPr algn="l"/>
             <a:r>
               <a:rPr lang="en-US" sz="3600"/>
-              <a:t>Answer 2 of 10 in week 8</a:t>
+              <a:t>Answer 2 of 10 in round 8</a:t>
             </a:r>
             <a:endParaRPr lang="en-US" sz="1100"/>
           </a:p>
@@ -15006,7 +15006,7 @@
             <a:pPr algn="l"/>
             <a:r>
               <a:rPr lang="en-US" sz="4400"/>
-              <a:t>Question 3 of 10 in week 8</a:t>
+              <a:t>Question 3 of 10 in round 8</a:t>
             </a:r>
             <a:endParaRPr lang="en-US" sz="1100"/>
           </a:p>
@@ -15034,7 +15034,7 @@
             <a:pPr algn="l"/>
             <a:r>
               <a:rPr lang="en-US" sz="3600"/>
-              <a:t>Answer 3 of 10 in week 8</a:t>
+              <a:t>Answer 3 of 10 in round 8</a:t>
             </a:r>
             <a:endParaRPr lang="en-US" sz="1100"/>
           </a:p>
@@ -15115,7 +15115,7 @@
             <a:pPr algn="l"/>
             <a:r>
               <a:rPr lang="en-US" sz="4400"/>
-              <a:t>Question 4 of 10 in week 8</a:t>
+              <a:t>Question 4 of 10 in round 8</a:t>
             </a:r>
             <a:endParaRPr lang="en-US" sz="1100"/>
           </a:p>
@@ -15143,7 +15143,7 @@
             <a:pPr algn="l"/>
             <a:r>
               <a:rPr lang="en-US" sz="3600"/>
-              <a:t>Answer 4 of 10 in week 8</a:t>
+              <a:t>Answer 4 of 10 in round 8</a:t>
             </a:r>
             <a:endParaRPr lang="en-US" sz="1100"/>
           </a:p>
@@ -15224,7 +15224,7 @@
             <a:pPr algn="l"/>
             <a:r>
               <a:rPr lang="en-US" sz="4400"/>
-              <a:t>Question 5 of 10 in week 8</a:t>
+              <a:t>Question 5 of 10 in round 8</a:t>
             </a:r>
             <a:endParaRPr lang="en-US" sz="1100"/>
           </a:p>
@@ -15252,7 +15252,7 @@
             <a:pPr algn="l"/>
             <a:r>
               <a:rPr lang="en-US" sz="3600"/>
-              <a:t>Answer 5 of 10 in week 8</a:t>
+              <a:t>Answer 5 of 10 in round 8</a:t>
             </a:r>
             <a:endParaRPr lang="en-US" sz="1100"/>
           </a:p>
@@ -15333,7 +15333,7 @@
             <a:pPr algn="l"/>
             <a:r>
               <a:rPr lang="en-US" sz="4400"/>
-              <a:t>Question 6 of 10 in week 8</a:t>
+              <a:t>Question 6 of 10 in round 8</a:t>
             </a:r>
             <a:endParaRPr lang="en-US" sz="1100"/>
           </a:p>
@@ -15361,7 +15361,7 @@
             <a:pPr algn="l"/>
             <a:r>
               <a:rPr lang="en-US" sz="3600"/>
-              <a:t>Answer 6 of 10 in week 8</a:t>
+              <a:t>Answer 6 of 10 in round 8</a:t>
             </a:r>
             <a:endParaRPr lang="en-US" sz="1100"/>
           </a:p>
@@ -15442,7 +15442,7 @@
             <a:pPr algn="l"/>
             <a:r>
               <a:rPr lang="en-US" sz="4400"/>
-              <a:t>Question 7 of 10 in week 8</a:t>
+              <a:t>Question 7 of 10 in round 8</a:t>
             </a:r>
             <a:endParaRPr lang="en-US" sz="1100"/>
           </a:p>
@@ -15470,7 +15470,7 @@
             <a:pPr algn="l"/>
             <a:r>
               <a:rPr lang="en-US" sz="3600"/>
-              <a:t>Answer 7 of 10 in week 8</a:t>
+              <a:t>Answer 7 of 10 in round 8</a:t>
             </a:r>
             <a:endParaRPr lang="en-US" sz="1100"/>
           </a:p>
@@ -15551,7 +15551,7 @@
             <a:pPr algn="l"/>
             <a:r>
               <a:rPr lang="en-US" sz="4400"/>
-              <a:t>Question 8 of 10 in week 8</a:t>
+              <a:t>Question 8 of 10 in round 8</a:t>
             </a:r>
             <a:endParaRPr lang="en-US" sz="1100"/>
           </a:p>
@@ -15579,7 +15579,7 @@
             <a:pPr algn="l"/>
             <a:r>
               <a:rPr lang="en-US" sz="3600"/>
-              <a:t>Answer 8 of 10 in week 8</a:t>
+              <a:t>Answer 8 of 10 in round 8</a:t>
             </a:r>
             <a:endParaRPr lang="en-US" sz="1100"/>
           </a:p>
@@ -15660,7 +15660,7 @@
             <a:pPr algn="l"/>
             <a:r>
               <a:rPr lang="en-US" sz="4400"/>
-              <a:t>Question 9 of 10 in week 8</a:t>
+              <a:t>Question 9 of 10 in round 8</a:t>
             </a:r>
             <a:endParaRPr lang="en-US" sz="1100"/>
           </a:p>
@@ -15688,7 +15688,7 @@
             <a:pPr algn="l"/>
             <a:r>
               <a:rPr lang="en-US" sz="3600"/>
-              <a:t>Answer 9 of 10 in week 8</a:t>
+              <a:t>Answer 9 of 10 in round 8</a:t>
             </a:r>
             <a:endParaRPr lang="en-US" sz="1100"/>
           </a:p>
@@ -15769,7 +15769,7 @@
             <a:pPr algn="l"/>
             <a:r>
               <a:rPr lang="en-US" sz="4400"/>
-              <a:t>Question 10 of 10 in week 8</a:t>
+              <a:t>Question 10 of 10 in round 8</a:t>
             </a:r>
             <a:endParaRPr lang="en-US" sz="1100"/>
           </a:p>
@@ -15797,7 +15797,7 @@
             <a:pPr algn="l"/>
             <a:r>
               <a:rPr lang="en-US" sz="3600"/>
-              <a:t>Answer 10 of 10 in week 8</a:t>
+              <a:t>Answer 10 of 10 in round 8</a:t>
             </a:r>
             <a:endParaRPr lang="en-US" sz="1100"/>
           </a:p>

</xml_diff>